<commit_message>
blockchain transactions to be stored from docker itself with unique sender address
</commit_message>
<xml_diff>
--- a/files/Batch-4 First Review.pptx
+++ b/files/Batch-4 First Review.pptx
@@ -39120,9 +39120,9 @@
                 <a:cs typeface="Times New Roman"/>
                 <a:sym typeface="Times New Roman"/>
               </a:rPr>
-              <a:t>Design and implement a Multi-Access Edge Computing (MEC) framework for efficient resource allocation, ensuring low-latency, modular edge computing.</a:t>
+              <a:t>Design and implement a Multi-Access Edge Computing (MEC) framework for efficient resource allocation using the pretrained LightGBM model .</a:t>
             </a:r>
-            <a:endParaRPr b="1" sz="1700">
+            <a:endParaRPr sz="1700">
               <a:solidFill>
                 <a:schemeClr val="dk1"/>
               </a:solidFill>
@@ -39322,55 +39322,7 @@
                 <a:cs typeface="Times New Roman"/>
                 <a:sym typeface="Times New Roman"/>
               </a:rPr>
-              <a:t>Set up Docker containers or other </a:t>
-            </a:r>
-            <a:r>
-              <a:rPr lang="en" sz="1700">
-                <a:solidFill>
-                  <a:schemeClr val="dk1"/>
-                </a:solidFill>
-                <a:latin typeface="Times New Roman"/>
-                <a:ea typeface="Times New Roman"/>
-                <a:cs typeface="Times New Roman"/>
-                <a:sym typeface="Times New Roman"/>
-              </a:rPr>
-              <a:t>Simulation</a:t>
-            </a:r>
-            <a:r>
-              <a:rPr lang="en" sz="1700">
-                <a:solidFill>
-                  <a:schemeClr val="dk1"/>
-                </a:solidFill>
-                <a:latin typeface="Times New Roman"/>
-                <a:ea typeface="Times New Roman"/>
-                <a:cs typeface="Times New Roman"/>
-                <a:sym typeface="Times New Roman"/>
-              </a:rPr>
-              <a:t> </a:t>
-            </a:r>
-            <a:r>
-              <a:rPr lang="en" sz="1700">
-                <a:solidFill>
-                  <a:schemeClr val="dk1"/>
-                </a:solidFill>
-                <a:latin typeface="Times New Roman"/>
-                <a:ea typeface="Times New Roman"/>
-                <a:cs typeface="Times New Roman"/>
-                <a:sym typeface="Times New Roman"/>
-              </a:rPr>
-              <a:t>tools</a:t>
-            </a:r>
-            <a:r>
-              <a:rPr lang="en" sz="1700">
-                <a:solidFill>
-                  <a:schemeClr val="dk1"/>
-                </a:solidFill>
-                <a:latin typeface="Times New Roman"/>
-                <a:ea typeface="Times New Roman"/>
-                <a:cs typeface="Times New Roman"/>
-                <a:sym typeface="Times New Roman"/>
-              </a:rPr>
-              <a:t> (Starlingx and openstack)and network slicing.</a:t>
+              <a:t>Set up Docker containers for each edge node listening at individual ports.</a:t>
             </a:r>
             <a:endParaRPr sz="1700">
               <a:solidFill>
@@ -40016,7 +39968,7 @@
                 <a:cs typeface="Times New Roman"/>
                 <a:sym typeface="Times New Roman"/>
               </a:rPr>
-              <a:t>Decentralized resource management with blockchain.</a:t>
+              <a:t>Decentralized resource management of user logs data with blockchain.</a:t>
             </a:r>
             <a:endParaRPr sz="1700">
               <a:solidFill>
@@ -40096,7 +40048,7 @@
                 <a:cs typeface="Times New Roman"/>
                 <a:sym typeface="Times New Roman"/>
               </a:rPr>
-              <a:t>Set up a blockchain framework (e.g., public, private, hybrid) and deploy smart contracts.</a:t>
+              <a:t>Set up a blockchain framework using ethereum and deploy smart contracts.</a:t>
             </a:r>
             <a:endParaRPr sz="1700">
               <a:solidFill>
@@ -40136,7 +40088,7 @@
                 <a:cs typeface="Times New Roman"/>
                 <a:sym typeface="Times New Roman"/>
               </a:rPr>
-              <a:t>Integrate blockchain with MEC and test SLA compliance, performance, and optimization.</a:t>
+              <a:t>Integrate blockchain with MEC.</a:t>
             </a:r>
             <a:endParaRPr sz="1700">
               <a:solidFill>
@@ -44349,7 +44301,7 @@
                 <a:cs typeface="Times New Roman"/>
                 <a:sym typeface="Times New Roman"/>
               </a:rPr>
-              <a:t>With the rise of 5G networks, the demand for ultra-low latency and high-speed connectivity has grown exponentially. Multi-Access Edge Computing (MEC) has emerged as a transformative solution by bringing data processing closer to users, enabling faster and more efficient performance. MEC supports various 5G applications, including enhanced mobile broadband (eMBB), ultra-reliable low-latency communication (URLLC), and massive machine-type communication (mMTC), making it a cornerstone for next-generation technologies like IoT, smart cities, and autonomous systems.</a:t>
+              <a:t>With the rise of 5G networks, the demand for ultra-low latency and high-speed connectivity has grown exponentially. Multi-Access Edge Computing (MEC) has emerged as a transformative solution by bringing data processing closer to users, enabling faster and more efficient performance. MEC supports various 5G applications, including enhanced Mobile Broadband (eMBB), Ultra-Reliable Low-Latency Communication (URLLC), and Massive Machine-type Communication (mMTC), making it a cornerstone for next-generation technologies like IoT, smart cities, and autonomous systems.</a:t>
             </a:r>
             <a:endParaRPr sz="1500">
               <a:latin typeface="Times New Roman"/>
@@ -48347,7 +48299,7 @@
             <a:tbl>
               <a:tblPr>
                 <a:noFill/>
-                <a:tableStyleId>{FAEBCF9C-F868-429D-833F-0B10FE351608}</a:tableStyleId>
+                <a:tableStyleId>{1636267A-0844-4F64-94DA-CB2050401101}</a:tableStyleId>
               </a:tblPr>
               <a:tblGrid>
                 <a:gridCol w="425425"/>
@@ -49920,7 +49872,7 @@
             <a:tbl>
               <a:tblPr>
                 <a:noFill/>
-                <a:tableStyleId>{FAEBCF9C-F868-429D-833F-0B10FE351608}</a:tableStyleId>
+                <a:tableStyleId>{1636267A-0844-4F64-94DA-CB2050401101}</a:tableStyleId>
               </a:tblPr>
               <a:tblGrid>
                 <a:gridCol w="372475"/>
@@ -51021,7 +50973,7 @@
             <a:tbl>
               <a:tblPr>
                 <a:noFill/>
-                <a:tableStyleId>{FAEBCF9C-F868-429D-833F-0B10FE351608}</a:tableStyleId>
+                <a:tableStyleId>{1636267A-0844-4F64-94DA-CB2050401101}</a:tableStyleId>
               </a:tblPr>
               <a:tblGrid>
                 <a:gridCol w="265250"/>
@@ -52103,7 +52055,7 @@
             <a:tbl>
               <a:tblPr>
                 <a:noFill/>
-                <a:tableStyleId>{FAEBCF9C-F868-429D-833F-0B10FE351608}</a:tableStyleId>
+                <a:tableStyleId>{1636267A-0844-4F64-94DA-CB2050401101}</a:tableStyleId>
               </a:tblPr>
               <a:tblGrid>
                 <a:gridCol w="287775"/>
@@ -54189,9 +54141,9 @@
 </file>
 
 <file path=ppt/theme/theme1.xml><?xml version="1.0" encoding="utf-8"?>
-<a:theme xmlns:a="http://schemas.openxmlformats.org/drawingml/2006/main" xmlns:r="http://schemas.openxmlformats.org/officeDocument/2006/relationships" name="Office Theme">
+<a:theme xmlns:a="http://schemas.openxmlformats.org/drawingml/2006/main" xmlns:r="http://schemas.openxmlformats.org/officeDocument/2006/relationships" name="Simple Light">
   <a:themeElements>
-    <a:clrScheme name="Office">
+    <a:clrScheme name="Simple Light">
       <a:dk1>
         <a:srgbClr val="000000"/>
       </a:dk1>
@@ -54199,34 +54151,34 @@
         <a:srgbClr val="FFFFFF"/>
       </a:lt1>
       <a:dk2>
-        <a:srgbClr val="1F497D"/>
+        <a:srgbClr val="595959"/>
       </a:dk2>
       <a:lt2>
-        <a:srgbClr val="EEECE1"/>
+        <a:srgbClr val="EEEEEE"/>
       </a:lt2>
       <a:accent1>
-        <a:srgbClr val="4F81BD"/>
+        <a:srgbClr val="4285F4"/>
       </a:accent1>
       <a:accent2>
-        <a:srgbClr val="C0504D"/>
+        <a:srgbClr val="212121"/>
       </a:accent2>
       <a:accent3>
-        <a:srgbClr val="9BBB59"/>
+        <a:srgbClr val="78909C"/>
       </a:accent3>
       <a:accent4>
-        <a:srgbClr val="8064A2"/>
+        <a:srgbClr val="FFAB40"/>
       </a:accent4>
       <a:accent5>
-        <a:srgbClr val="4BACC6"/>
+        <a:srgbClr val="0097A7"/>
       </a:accent5>
       <a:accent6>
-        <a:srgbClr val="F79646"/>
+        <a:srgbClr val="EEFF41"/>
       </a:accent6>
       <a:hlink>
-        <a:srgbClr val="0000FF"/>
+        <a:srgbClr val="0097A7"/>
       </a:hlink>
       <a:folHlink>
-        <a:srgbClr val="800080"/>
+        <a:srgbClr val="0097A7"/>
       </a:folHlink>
     </a:clrScheme>
     <a:fontScheme name="Office">
@@ -54747,9 +54699,9 @@
 </file>
 
 <file path=ppt/theme/theme3.xml><?xml version="1.0" encoding="utf-8"?>
-<a:theme xmlns:a="http://schemas.openxmlformats.org/drawingml/2006/main" xmlns:r="http://schemas.openxmlformats.org/officeDocument/2006/relationships" name="Simple Light">
+<a:theme xmlns:a="http://schemas.openxmlformats.org/drawingml/2006/main" xmlns:r="http://schemas.openxmlformats.org/officeDocument/2006/relationships" name="Office Theme">
   <a:themeElements>
-    <a:clrScheme name="Simple Light">
+    <a:clrScheme name="Office">
       <a:dk1>
         <a:srgbClr val="000000"/>
       </a:dk1>
@@ -54757,34 +54709,34 @@
         <a:srgbClr val="FFFFFF"/>
       </a:lt1>
       <a:dk2>
-        <a:srgbClr val="595959"/>
+        <a:srgbClr val="1F497D"/>
       </a:dk2>
       <a:lt2>
-        <a:srgbClr val="EEEEEE"/>
+        <a:srgbClr val="EEECE1"/>
       </a:lt2>
       <a:accent1>
-        <a:srgbClr val="4285F4"/>
+        <a:srgbClr val="4F81BD"/>
       </a:accent1>
       <a:accent2>
-        <a:srgbClr val="212121"/>
+        <a:srgbClr val="C0504D"/>
       </a:accent2>
       <a:accent3>
-        <a:srgbClr val="78909C"/>
+        <a:srgbClr val="9BBB59"/>
       </a:accent3>
       <a:accent4>
-        <a:srgbClr val="FFAB40"/>
+        <a:srgbClr val="8064A2"/>
       </a:accent4>
       <a:accent5>
-        <a:srgbClr val="0097A7"/>
+        <a:srgbClr val="4BACC6"/>
       </a:accent5>
       <a:accent6>
-        <a:srgbClr val="EEFF41"/>
+        <a:srgbClr val="F79646"/>
       </a:accent6>
       <a:hlink>
-        <a:srgbClr val="0097A7"/>
+        <a:srgbClr val="0000FF"/>
       </a:hlink>
       <a:folHlink>
-        <a:srgbClr val="0097A7"/>
+        <a:srgbClr val="800080"/>
       </a:folHlink>
     </a:clrScheme>
     <a:fontScheme name="Office">

</xml_diff>